<commit_message>
Slide Updates Win 2024
</commit_message>
<xml_diff>
--- a/CSE280Wk1Day2.pptx
+++ b/CSE280Wk1Day2.pptx
@@ -141,471 +141,6 @@
 </p1510:revInfo>
 </file>
 
-<file path=ppt/changesInfos/changesInfo1.xml><?xml version="1.0" encoding="utf-8"?>
-<pc:chgInfo xmlns:a="http://schemas.openxmlformats.org/drawingml/2006/main" xmlns:r="http://schemas.openxmlformats.org/officeDocument/2006/relationships" xmlns:ac="http://schemas.microsoft.com/office/drawing/2013/main/command" xmlns:pc="http://schemas.microsoft.com/office/powerpoint/2013/main/command">
-  <pc:docChgLst>
-    <pc:chgData name="Clements, William" userId="cbdb0636-a496-422a-8d40-98c53d494d26" providerId="ADAL" clId="{FBD9B809-8698-1B41-A7A9-DEC9F2C60212}"/>
-    <pc:docChg chg="addSld modSld">
-      <pc:chgData name="Clements, William" userId="cbdb0636-a496-422a-8d40-98c53d494d26" providerId="ADAL" clId="{FBD9B809-8698-1B41-A7A9-DEC9F2C60212}" dt="2023-09-13T14:47:23.968" v="177" actId="20577"/>
-      <pc:docMkLst>
-        <pc:docMk/>
-      </pc:docMkLst>
-      <pc:sldChg chg="modSp">
-        <pc:chgData name="Clements, William" userId="cbdb0636-a496-422a-8d40-98c53d494d26" providerId="ADAL" clId="{FBD9B809-8698-1B41-A7A9-DEC9F2C60212}" dt="2023-09-12T20:58:09.076" v="0"/>
-        <pc:sldMkLst>
-          <pc:docMk/>
-          <pc:sldMk cId="180888602" sldId="256"/>
-        </pc:sldMkLst>
-        <pc:spChg chg="mod">
-          <ac:chgData name="Clements, William" userId="cbdb0636-a496-422a-8d40-98c53d494d26" providerId="ADAL" clId="{FBD9B809-8698-1B41-A7A9-DEC9F2C60212}" dt="2023-09-12T20:58:09.076" v="0"/>
-          <ac:spMkLst>
-            <pc:docMk/>
-            <pc:sldMk cId="180888602" sldId="256"/>
-            <ac:spMk id="2" creationId="{52B11A2F-EC38-2761-F2FA-BB23B625A328}"/>
-          </ac:spMkLst>
-        </pc:spChg>
-        <pc:spChg chg="mod">
-          <ac:chgData name="Clements, William" userId="cbdb0636-a496-422a-8d40-98c53d494d26" providerId="ADAL" clId="{FBD9B809-8698-1B41-A7A9-DEC9F2C60212}" dt="2023-09-12T20:58:09.076" v="0"/>
-          <ac:spMkLst>
-            <pc:docMk/>
-            <pc:sldMk cId="180888602" sldId="256"/>
-            <ac:spMk id="3" creationId="{37F5C48A-AA69-5D39-E5FC-9E8E1FEA4AB0}"/>
-          </ac:spMkLst>
-        </pc:spChg>
-      </pc:sldChg>
-      <pc:sldChg chg="modSp">
-        <pc:chgData name="Clements, William" userId="cbdb0636-a496-422a-8d40-98c53d494d26" providerId="ADAL" clId="{FBD9B809-8698-1B41-A7A9-DEC9F2C60212}" dt="2023-09-12T20:58:09.076" v="0"/>
-        <pc:sldMkLst>
-          <pc:docMk/>
-          <pc:sldMk cId="3749234364" sldId="257"/>
-        </pc:sldMkLst>
-        <pc:spChg chg="mod">
-          <ac:chgData name="Clements, William" userId="cbdb0636-a496-422a-8d40-98c53d494d26" providerId="ADAL" clId="{FBD9B809-8698-1B41-A7A9-DEC9F2C60212}" dt="2023-09-12T20:58:09.076" v="0"/>
-          <ac:spMkLst>
-            <pc:docMk/>
-            <pc:sldMk cId="3749234364" sldId="257"/>
-            <ac:spMk id="2" creationId="{ADA63D87-523A-4718-87DE-9B3D33678CAC}"/>
-          </ac:spMkLst>
-        </pc:spChg>
-        <pc:spChg chg="mod">
-          <ac:chgData name="Clements, William" userId="cbdb0636-a496-422a-8d40-98c53d494d26" providerId="ADAL" clId="{FBD9B809-8698-1B41-A7A9-DEC9F2C60212}" dt="2023-09-12T20:58:09.076" v="0"/>
-          <ac:spMkLst>
-            <pc:docMk/>
-            <pc:sldMk cId="3749234364" sldId="257"/>
-            <ac:spMk id="3" creationId="{B741DA17-66FF-48DE-8BC8-6B8576BF006E}"/>
-          </ac:spMkLst>
-        </pc:spChg>
-      </pc:sldChg>
-      <pc:sldChg chg="modSp">
-        <pc:chgData name="Clements, William" userId="cbdb0636-a496-422a-8d40-98c53d494d26" providerId="ADAL" clId="{FBD9B809-8698-1B41-A7A9-DEC9F2C60212}" dt="2023-09-12T20:58:09.076" v="0"/>
-        <pc:sldMkLst>
-          <pc:docMk/>
-          <pc:sldMk cId="634591183" sldId="258"/>
-        </pc:sldMkLst>
-        <pc:spChg chg="mod">
-          <ac:chgData name="Clements, William" userId="cbdb0636-a496-422a-8d40-98c53d494d26" providerId="ADAL" clId="{FBD9B809-8698-1B41-A7A9-DEC9F2C60212}" dt="2023-09-12T20:58:09.076" v="0"/>
-          <ac:spMkLst>
-            <pc:docMk/>
-            <pc:sldMk cId="634591183" sldId="258"/>
-            <ac:spMk id="2" creationId="{ADA63D87-523A-4718-87DE-9B3D33678CAC}"/>
-          </ac:spMkLst>
-        </pc:spChg>
-        <pc:spChg chg="mod">
-          <ac:chgData name="Clements, William" userId="cbdb0636-a496-422a-8d40-98c53d494d26" providerId="ADAL" clId="{FBD9B809-8698-1B41-A7A9-DEC9F2C60212}" dt="2023-09-12T20:58:09.076" v="0"/>
-          <ac:spMkLst>
-            <pc:docMk/>
-            <pc:sldMk cId="634591183" sldId="258"/>
-            <ac:spMk id="3" creationId="{B741DA17-66FF-48DE-8BC8-6B8576BF006E}"/>
-          </ac:spMkLst>
-        </pc:spChg>
-      </pc:sldChg>
-      <pc:sldChg chg="modSp">
-        <pc:chgData name="Clements, William" userId="cbdb0636-a496-422a-8d40-98c53d494d26" providerId="ADAL" clId="{FBD9B809-8698-1B41-A7A9-DEC9F2C60212}" dt="2023-09-12T20:58:09.076" v="0"/>
-        <pc:sldMkLst>
-          <pc:docMk/>
-          <pc:sldMk cId="2734254563" sldId="259"/>
-        </pc:sldMkLst>
-        <pc:spChg chg="mod">
-          <ac:chgData name="Clements, William" userId="cbdb0636-a496-422a-8d40-98c53d494d26" providerId="ADAL" clId="{FBD9B809-8698-1B41-A7A9-DEC9F2C60212}" dt="2023-09-12T20:58:09.076" v="0"/>
-          <ac:spMkLst>
-            <pc:docMk/>
-            <pc:sldMk cId="2734254563" sldId="259"/>
-            <ac:spMk id="2" creationId="{70849004-0F04-496C-8BBE-3BD18C0999FE}"/>
-          </ac:spMkLst>
-        </pc:spChg>
-        <pc:spChg chg="mod">
-          <ac:chgData name="Clements, William" userId="cbdb0636-a496-422a-8d40-98c53d494d26" providerId="ADAL" clId="{FBD9B809-8698-1B41-A7A9-DEC9F2C60212}" dt="2023-09-12T20:58:09.076" v="0"/>
-          <ac:spMkLst>
-            <pc:docMk/>
-            <pc:sldMk cId="2734254563" sldId="259"/>
-            <ac:spMk id="3" creationId="{09770F3C-1704-49B5-97D5-389FFA9F5E42}"/>
-          </ac:spMkLst>
-        </pc:spChg>
-      </pc:sldChg>
-      <pc:sldChg chg="modSp">
-        <pc:chgData name="Clements, William" userId="cbdb0636-a496-422a-8d40-98c53d494d26" providerId="ADAL" clId="{FBD9B809-8698-1B41-A7A9-DEC9F2C60212}" dt="2023-09-12T20:58:09.076" v="0"/>
-        <pc:sldMkLst>
-          <pc:docMk/>
-          <pc:sldMk cId="589958030" sldId="260"/>
-        </pc:sldMkLst>
-        <pc:spChg chg="mod">
-          <ac:chgData name="Clements, William" userId="cbdb0636-a496-422a-8d40-98c53d494d26" providerId="ADAL" clId="{FBD9B809-8698-1B41-A7A9-DEC9F2C60212}" dt="2023-09-12T20:58:09.076" v="0"/>
-          <ac:spMkLst>
-            <pc:docMk/>
-            <pc:sldMk cId="589958030" sldId="260"/>
-            <ac:spMk id="2" creationId="{1CA9FB50-4B57-43EC-ABDA-7B35C858A603}"/>
-          </ac:spMkLst>
-        </pc:spChg>
-        <pc:spChg chg="mod">
-          <ac:chgData name="Clements, William" userId="cbdb0636-a496-422a-8d40-98c53d494d26" providerId="ADAL" clId="{FBD9B809-8698-1B41-A7A9-DEC9F2C60212}" dt="2023-09-12T20:58:09.076" v="0"/>
-          <ac:spMkLst>
-            <pc:docMk/>
-            <pc:sldMk cId="589958030" sldId="260"/>
-            <ac:spMk id="3" creationId="{9039B911-02FC-4399-B710-F98746D29FEA}"/>
-          </ac:spMkLst>
-        </pc:spChg>
-      </pc:sldChg>
-      <pc:sldChg chg="modSp">
-        <pc:chgData name="Clements, William" userId="cbdb0636-a496-422a-8d40-98c53d494d26" providerId="ADAL" clId="{FBD9B809-8698-1B41-A7A9-DEC9F2C60212}" dt="2023-09-12T20:58:09.076" v="0"/>
-        <pc:sldMkLst>
-          <pc:docMk/>
-          <pc:sldMk cId="1934704567" sldId="261"/>
-        </pc:sldMkLst>
-        <pc:spChg chg="mod">
-          <ac:chgData name="Clements, William" userId="cbdb0636-a496-422a-8d40-98c53d494d26" providerId="ADAL" clId="{FBD9B809-8698-1B41-A7A9-DEC9F2C60212}" dt="2023-09-12T20:58:09.076" v="0"/>
-          <ac:spMkLst>
-            <pc:docMk/>
-            <pc:sldMk cId="1934704567" sldId="261"/>
-            <ac:spMk id="2" creationId="{09A07E31-7CA1-4DD2-AC0F-93E82A1545A9}"/>
-          </ac:spMkLst>
-        </pc:spChg>
-        <pc:spChg chg="mod">
-          <ac:chgData name="Clements, William" userId="cbdb0636-a496-422a-8d40-98c53d494d26" providerId="ADAL" clId="{FBD9B809-8698-1B41-A7A9-DEC9F2C60212}" dt="2023-09-12T20:58:09.076" v="0"/>
-          <ac:spMkLst>
-            <pc:docMk/>
-            <pc:sldMk cId="1934704567" sldId="261"/>
-            <ac:spMk id="3" creationId="{24F0A7E7-4349-425D-A773-7A0AA4E321FB}"/>
-          </ac:spMkLst>
-        </pc:spChg>
-      </pc:sldChg>
-      <pc:sldChg chg="modSp">
-        <pc:chgData name="Clements, William" userId="cbdb0636-a496-422a-8d40-98c53d494d26" providerId="ADAL" clId="{FBD9B809-8698-1B41-A7A9-DEC9F2C60212}" dt="2023-09-12T20:58:09.076" v="0"/>
-        <pc:sldMkLst>
-          <pc:docMk/>
-          <pc:sldMk cId="667664662" sldId="281"/>
-        </pc:sldMkLst>
-        <pc:spChg chg="mod">
-          <ac:chgData name="Clements, William" userId="cbdb0636-a496-422a-8d40-98c53d494d26" providerId="ADAL" clId="{FBD9B809-8698-1B41-A7A9-DEC9F2C60212}" dt="2023-09-12T20:58:09.076" v="0"/>
-          <ac:spMkLst>
-            <pc:docMk/>
-            <pc:sldMk cId="667664662" sldId="281"/>
-            <ac:spMk id="2" creationId="{D873DE6D-FB1F-4F85-A648-1F85D6734E17}"/>
-          </ac:spMkLst>
-        </pc:spChg>
-      </pc:sldChg>
-      <pc:sldChg chg="modSp">
-        <pc:chgData name="Clements, William" userId="cbdb0636-a496-422a-8d40-98c53d494d26" providerId="ADAL" clId="{FBD9B809-8698-1B41-A7A9-DEC9F2C60212}" dt="2023-09-12T20:58:09.076" v="0"/>
-        <pc:sldMkLst>
-          <pc:docMk/>
-          <pc:sldMk cId="1608723466" sldId="282"/>
-        </pc:sldMkLst>
-        <pc:spChg chg="mod">
-          <ac:chgData name="Clements, William" userId="cbdb0636-a496-422a-8d40-98c53d494d26" providerId="ADAL" clId="{FBD9B809-8698-1B41-A7A9-DEC9F2C60212}" dt="2023-09-12T20:58:09.076" v="0"/>
-          <ac:spMkLst>
-            <pc:docMk/>
-            <pc:sldMk cId="1608723466" sldId="282"/>
-            <ac:spMk id="2" creationId="{A7EADD88-2AD9-4EBB-8E36-37D6859F3E64}"/>
-          </ac:spMkLst>
-        </pc:spChg>
-      </pc:sldChg>
-      <pc:sldChg chg="modSp">
-        <pc:chgData name="Clements, William" userId="cbdb0636-a496-422a-8d40-98c53d494d26" providerId="ADAL" clId="{FBD9B809-8698-1B41-A7A9-DEC9F2C60212}" dt="2023-09-12T20:58:09.076" v="0"/>
-        <pc:sldMkLst>
-          <pc:docMk/>
-          <pc:sldMk cId="681799432" sldId="283"/>
-        </pc:sldMkLst>
-        <pc:spChg chg="mod">
-          <ac:chgData name="Clements, William" userId="cbdb0636-a496-422a-8d40-98c53d494d26" providerId="ADAL" clId="{FBD9B809-8698-1B41-A7A9-DEC9F2C60212}" dt="2023-09-12T20:58:09.076" v="0"/>
-          <ac:spMkLst>
-            <pc:docMk/>
-            <pc:sldMk cId="681799432" sldId="283"/>
-            <ac:spMk id="2" creationId="{032A6639-553D-4A11-A19F-F351046F5021}"/>
-          </ac:spMkLst>
-        </pc:spChg>
-        <pc:spChg chg="mod">
-          <ac:chgData name="Clements, William" userId="cbdb0636-a496-422a-8d40-98c53d494d26" providerId="ADAL" clId="{FBD9B809-8698-1B41-A7A9-DEC9F2C60212}" dt="2023-09-12T20:58:09.076" v="0"/>
-          <ac:spMkLst>
-            <pc:docMk/>
-            <pc:sldMk cId="681799432" sldId="283"/>
-            <ac:spMk id="3" creationId="{86A08F71-9BDE-41A3-BE10-24928970876A}"/>
-          </ac:spMkLst>
-        </pc:spChg>
-      </pc:sldChg>
-      <pc:sldChg chg="modSp">
-        <pc:chgData name="Clements, William" userId="cbdb0636-a496-422a-8d40-98c53d494d26" providerId="ADAL" clId="{FBD9B809-8698-1B41-A7A9-DEC9F2C60212}" dt="2023-09-12T20:58:09.076" v="0"/>
-        <pc:sldMkLst>
-          <pc:docMk/>
-          <pc:sldMk cId="2440786728" sldId="285"/>
-        </pc:sldMkLst>
-        <pc:spChg chg="mod">
-          <ac:chgData name="Clements, William" userId="cbdb0636-a496-422a-8d40-98c53d494d26" providerId="ADAL" clId="{FBD9B809-8698-1B41-A7A9-DEC9F2C60212}" dt="2023-09-12T20:58:09.076" v="0"/>
-          <ac:spMkLst>
-            <pc:docMk/>
-            <pc:sldMk cId="2440786728" sldId="285"/>
-            <ac:spMk id="2" creationId="{A7EADD88-2AD9-4EBB-8E36-37D6859F3E64}"/>
-          </ac:spMkLst>
-        </pc:spChg>
-        <pc:spChg chg="mod">
-          <ac:chgData name="Clements, William" userId="cbdb0636-a496-422a-8d40-98c53d494d26" providerId="ADAL" clId="{FBD9B809-8698-1B41-A7A9-DEC9F2C60212}" dt="2023-09-12T20:58:09.076" v="0"/>
-          <ac:spMkLst>
-            <pc:docMk/>
-            <pc:sldMk cId="2440786728" sldId="285"/>
-            <ac:spMk id="3" creationId="{EF2B1639-EFBE-4304-9FCE-D0129A2E1EC4}"/>
-          </ac:spMkLst>
-        </pc:spChg>
-      </pc:sldChg>
-      <pc:sldChg chg="modSp">
-        <pc:chgData name="Clements, William" userId="cbdb0636-a496-422a-8d40-98c53d494d26" providerId="ADAL" clId="{FBD9B809-8698-1B41-A7A9-DEC9F2C60212}" dt="2023-09-12T20:58:09.076" v="0"/>
-        <pc:sldMkLst>
-          <pc:docMk/>
-          <pc:sldMk cId="3540741526" sldId="286"/>
-        </pc:sldMkLst>
-        <pc:spChg chg="mod">
-          <ac:chgData name="Clements, William" userId="cbdb0636-a496-422a-8d40-98c53d494d26" providerId="ADAL" clId="{FBD9B809-8698-1B41-A7A9-DEC9F2C60212}" dt="2023-09-12T20:58:09.076" v="0"/>
-          <ac:spMkLst>
-            <pc:docMk/>
-            <pc:sldMk cId="3540741526" sldId="286"/>
-            <ac:spMk id="2" creationId="{A7EADD88-2AD9-4EBB-8E36-37D6859F3E64}"/>
-          </ac:spMkLst>
-        </pc:spChg>
-        <pc:spChg chg="mod">
-          <ac:chgData name="Clements, William" userId="cbdb0636-a496-422a-8d40-98c53d494d26" providerId="ADAL" clId="{FBD9B809-8698-1B41-A7A9-DEC9F2C60212}" dt="2023-09-12T20:58:09.076" v="0"/>
-          <ac:spMkLst>
-            <pc:docMk/>
-            <pc:sldMk cId="3540741526" sldId="286"/>
-            <ac:spMk id="3" creationId="{EF2B1639-EFBE-4304-9FCE-D0129A2E1EC4}"/>
-          </ac:spMkLst>
-        </pc:spChg>
-      </pc:sldChg>
-      <pc:sldChg chg="modSp mod">
-        <pc:chgData name="Clements, William" userId="cbdb0636-a496-422a-8d40-98c53d494d26" providerId="ADAL" clId="{FBD9B809-8698-1B41-A7A9-DEC9F2C60212}" dt="2023-09-13T14:38:35.297" v="119" actId="20577"/>
-        <pc:sldMkLst>
-          <pc:docMk/>
-          <pc:sldMk cId="3418562893" sldId="287"/>
-        </pc:sldMkLst>
-        <pc:spChg chg="mod">
-          <ac:chgData name="Clements, William" userId="cbdb0636-a496-422a-8d40-98c53d494d26" providerId="ADAL" clId="{FBD9B809-8698-1B41-A7A9-DEC9F2C60212}" dt="2023-09-12T20:58:09.076" v="0"/>
-          <ac:spMkLst>
-            <pc:docMk/>
-            <pc:sldMk cId="3418562893" sldId="287"/>
-            <ac:spMk id="2" creationId="{A7EADD88-2AD9-4EBB-8E36-37D6859F3E64}"/>
-          </ac:spMkLst>
-        </pc:spChg>
-        <pc:spChg chg="mod">
-          <ac:chgData name="Clements, William" userId="cbdb0636-a496-422a-8d40-98c53d494d26" providerId="ADAL" clId="{FBD9B809-8698-1B41-A7A9-DEC9F2C60212}" dt="2023-09-12T21:00:14.462" v="51" actId="20577"/>
-          <ac:spMkLst>
-            <pc:docMk/>
-            <pc:sldMk cId="3418562893" sldId="287"/>
-            <ac:spMk id="3" creationId="{EF2B1639-EFBE-4304-9FCE-D0129A2E1EC4}"/>
-          </ac:spMkLst>
-        </pc:spChg>
-        <pc:graphicFrameChg chg="modGraphic">
-          <ac:chgData name="Clements, William" userId="cbdb0636-a496-422a-8d40-98c53d494d26" providerId="ADAL" clId="{FBD9B809-8698-1B41-A7A9-DEC9F2C60212}" dt="2023-09-13T14:38:35.297" v="119" actId="20577"/>
-          <ac:graphicFrameMkLst>
-            <pc:docMk/>
-            <pc:sldMk cId="3418562893" sldId="287"/>
-            <ac:graphicFrameMk id="5" creationId="{35BA2B5C-8C69-ED04-7B38-44401E8E6D9D}"/>
-          </ac:graphicFrameMkLst>
-        </pc:graphicFrameChg>
-      </pc:sldChg>
-      <pc:sldChg chg="modSp mod">
-        <pc:chgData name="Clements, William" userId="cbdb0636-a496-422a-8d40-98c53d494d26" providerId="ADAL" clId="{FBD9B809-8698-1B41-A7A9-DEC9F2C60212}" dt="2023-09-12T21:00:41.612" v="53" actId="1076"/>
-        <pc:sldMkLst>
-          <pc:docMk/>
-          <pc:sldMk cId="3429639671" sldId="309"/>
-        </pc:sldMkLst>
-        <pc:spChg chg="mod">
-          <ac:chgData name="Clements, William" userId="cbdb0636-a496-422a-8d40-98c53d494d26" providerId="ADAL" clId="{FBD9B809-8698-1B41-A7A9-DEC9F2C60212}" dt="2023-09-12T20:58:09.076" v="0"/>
-          <ac:spMkLst>
-            <pc:docMk/>
-            <pc:sldMk cId="3429639671" sldId="309"/>
-            <ac:spMk id="2" creationId="{07BC8E42-0E95-D902-2902-A5A3A2D010B5}"/>
-          </ac:spMkLst>
-        </pc:spChg>
-        <pc:picChg chg="mod">
-          <ac:chgData name="Clements, William" userId="cbdb0636-a496-422a-8d40-98c53d494d26" providerId="ADAL" clId="{FBD9B809-8698-1B41-A7A9-DEC9F2C60212}" dt="2023-09-12T21:00:41.612" v="53" actId="1076"/>
-          <ac:picMkLst>
-            <pc:docMk/>
-            <pc:sldMk cId="3429639671" sldId="309"/>
-            <ac:picMk id="10" creationId="{4F85B9DA-5849-E659-5230-3CAD611CC528}"/>
-          </ac:picMkLst>
-        </pc:picChg>
-      </pc:sldChg>
-      <pc:sldChg chg="modSp">
-        <pc:chgData name="Clements, William" userId="cbdb0636-a496-422a-8d40-98c53d494d26" providerId="ADAL" clId="{FBD9B809-8698-1B41-A7A9-DEC9F2C60212}" dt="2023-09-12T20:58:09.076" v="0"/>
-        <pc:sldMkLst>
-          <pc:docMk/>
-          <pc:sldMk cId="2867973642" sldId="310"/>
-        </pc:sldMkLst>
-        <pc:spChg chg="mod">
-          <ac:chgData name="Clements, William" userId="cbdb0636-a496-422a-8d40-98c53d494d26" providerId="ADAL" clId="{FBD9B809-8698-1B41-A7A9-DEC9F2C60212}" dt="2023-09-12T20:58:09.076" v="0"/>
-          <ac:spMkLst>
-            <pc:docMk/>
-            <pc:sldMk cId="2867973642" sldId="310"/>
-            <ac:spMk id="2" creationId="{01C41FEF-61AD-8709-2DC5-FB3F607A1475}"/>
-          </ac:spMkLst>
-        </pc:spChg>
-      </pc:sldChg>
-      <pc:sldChg chg="modSp">
-        <pc:chgData name="Clements, William" userId="cbdb0636-a496-422a-8d40-98c53d494d26" providerId="ADAL" clId="{FBD9B809-8698-1B41-A7A9-DEC9F2C60212}" dt="2023-09-12T20:58:09.076" v="0"/>
-        <pc:sldMkLst>
-          <pc:docMk/>
-          <pc:sldMk cId="2665913404" sldId="311"/>
-        </pc:sldMkLst>
-        <pc:spChg chg="mod">
-          <ac:chgData name="Clements, William" userId="cbdb0636-a496-422a-8d40-98c53d494d26" providerId="ADAL" clId="{FBD9B809-8698-1B41-A7A9-DEC9F2C60212}" dt="2023-09-12T20:58:09.076" v="0"/>
-          <ac:spMkLst>
-            <pc:docMk/>
-            <pc:sldMk cId="2665913404" sldId="311"/>
-            <ac:spMk id="2" creationId="{CE401CEC-9541-B31F-B451-9C28A6792931}"/>
-          </ac:spMkLst>
-        </pc:spChg>
-        <pc:spChg chg="mod">
-          <ac:chgData name="Clements, William" userId="cbdb0636-a496-422a-8d40-98c53d494d26" providerId="ADAL" clId="{FBD9B809-8698-1B41-A7A9-DEC9F2C60212}" dt="2023-09-12T20:58:09.076" v="0"/>
-          <ac:spMkLst>
-            <pc:docMk/>
-            <pc:sldMk cId="2665913404" sldId="311"/>
-            <ac:spMk id="3" creationId="{2001297D-2A9C-8276-C592-CE4DD74A42B8}"/>
-          </ac:spMkLst>
-        </pc:spChg>
-      </pc:sldChg>
-      <pc:sldChg chg="modSp">
-        <pc:chgData name="Clements, William" userId="cbdb0636-a496-422a-8d40-98c53d494d26" providerId="ADAL" clId="{FBD9B809-8698-1B41-A7A9-DEC9F2C60212}" dt="2023-09-12T20:58:09.076" v="0"/>
-        <pc:sldMkLst>
-          <pc:docMk/>
-          <pc:sldMk cId="1318708150" sldId="312"/>
-        </pc:sldMkLst>
-        <pc:spChg chg="mod">
-          <ac:chgData name="Clements, William" userId="cbdb0636-a496-422a-8d40-98c53d494d26" providerId="ADAL" clId="{FBD9B809-8698-1B41-A7A9-DEC9F2C60212}" dt="2023-09-12T20:58:09.076" v="0"/>
-          <ac:spMkLst>
-            <pc:docMk/>
-            <pc:sldMk cId="1318708150" sldId="312"/>
-            <ac:spMk id="2" creationId="{C4B89CF5-5426-4BDC-B693-1A462BFE35D7}"/>
-          </ac:spMkLst>
-        </pc:spChg>
-        <pc:spChg chg="mod">
-          <ac:chgData name="Clements, William" userId="cbdb0636-a496-422a-8d40-98c53d494d26" providerId="ADAL" clId="{FBD9B809-8698-1B41-A7A9-DEC9F2C60212}" dt="2023-09-12T20:58:09.076" v="0"/>
-          <ac:spMkLst>
-            <pc:docMk/>
-            <pc:sldMk cId="1318708150" sldId="312"/>
-            <ac:spMk id="3" creationId="{909962AF-C552-D520-5ABB-8DE6093F2BA0}"/>
-          </ac:spMkLst>
-        </pc:spChg>
-      </pc:sldChg>
-      <pc:sldChg chg="modSp">
-        <pc:chgData name="Clements, William" userId="cbdb0636-a496-422a-8d40-98c53d494d26" providerId="ADAL" clId="{FBD9B809-8698-1B41-A7A9-DEC9F2C60212}" dt="2023-09-12T20:58:09.076" v="0"/>
-        <pc:sldMkLst>
-          <pc:docMk/>
-          <pc:sldMk cId="1488169414" sldId="313"/>
-        </pc:sldMkLst>
-        <pc:spChg chg="mod">
-          <ac:chgData name="Clements, William" userId="cbdb0636-a496-422a-8d40-98c53d494d26" providerId="ADAL" clId="{FBD9B809-8698-1B41-A7A9-DEC9F2C60212}" dt="2023-09-12T20:58:09.076" v="0"/>
-          <ac:spMkLst>
-            <pc:docMk/>
-            <pc:sldMk cId="1488169414" sldId="313"/>
-            <ac:spMk id="2" creationId="{DEB332ED-3AD4-2B54-03FC-2E481320620A}"/>
-          </ac:spMkLst>
-        </pc:spChg>
-        <pc:spChg chg="mod">
-          <ac:chgData name="Clements, William" userId="cbdb0636-a496-422a-8d40-98c53d494d26" providerId="ADAL" clId="{FBD9B809-8698-1B41-A7A9-DEC9F2C60212}" dt="2023-09-12T20:58:09.076" v="0"/>
-          <ac:spMkLst>
-            <pc:docMk/>
-            <pc:sldMk cId="1488169414" sldId="313"/>
-            <ac:spMk id="3" creationId="{933E2582-AE17-D07A-9D35-85E791E9FD3D}"/>
-          </ac:spMkLst>
-        </pc:spChg>
-      </pc:sldChg>
-      <pc:sldChg chg="addSp modSp mod">
-        <pc:chgData name="Clements, William" userId="cbdb0636-a496-422a-8d40-98c53d494d26" providerId="ADAL" clId="{FBD9B809-8698-1B41-A7A9-DEC9F2C60212}" dt="2023-09-12T21:01:37.866" v="87" actId="6549"/>
-        <pc:sldMkLst>
-          <pc:docMk/>
-          <pc:sldMk cId="2041648222" sldId="314"/>
-        </pc:sldMkLst>
-        <pc:spChg chg="mod">
-          <ac:chgData name="Clements, William" userId="cbdb0636-a496-422a-8d40-98c53d494d26" providerId="ADAL" clId="{FBD9B809-8698-1B41-A7A9-DEC9F2C60212}" dt="2023-09-12T20:58:09.076" v="0"/>
-          <ac:spMkLst>
-            <pc:docMk/>
-            <pc:sldMk cId="2041648222" sldId="314"/>
-            <ac:spMk id="2" creationId="{4B651FAD-62E9-5CDE-4E6D-31BD6E4E21E8}"/>
-          </ac:spMkLst>
-        </pc:spChg>
-        <pc:spChg chg="add mod">
-          <ac:chgData name="Clements, William" userId="cbdb0636-a496-422a-8d40-98c53d494d26" providerId="ADAL" clId="{FBD9B809-8698-1B41-A7A9-DEC9F2C60212}" dt="2023-09-12T21:01:29.304" v="73" actId="1076"/>
-          <ac:spMkLst>
-            <pc:docMk/>
-            <pc:sldMk cId="2041648222" sldId="314"/>
-            <ac:spMk id="3" creationId="{BDE4216D-947C-B0F0-A126-4A109C06E780}"/>
-          </ac:spMkLst>
-        </pc:spChg>
-        <pc:spChg chg="add mod">
-          <ac:chgData name="Clements, William" userId="cbdb0636-a496-422a-8d40-98c53d494d26" providerId="ADAL" clId="{FBD9B809-8698-1B41-A7A9-DEC9F2C60212}" dt="2023-09-12T21:01:37.866" v="87" actId="6549"/>
-          <ac:spMkLst>
-            <pc:docMk/>
-            <pc:sldMk cId="2041648222" sldId="314"/>
-            <ac:spMk id="4" creationId="{E6E6A42C-C431-4385-5E52-429BF5FCF384}"/>
-          </ac:spMkLst>
-        </pc:spChg>
-      </pc:sldChg>
-      <pc:sldChg chg="modSp add mod">
-        <pc:chgData name="Clements, William" userId="cbdb0636-a496-422a-8d40-98c53d494d26" providerId="ADAL" clId="{FBD9B809-8698-1B41-A7A9-DEC9F2C60212}" dt="2023-09-13T14:45:09.104" v="169" actId="20577"/>
-        <pc:sldMkLst>
-          <pc:docMk/>
-          <pc:sldMk cId="4291617032" sldId="328"/>
-        </pc:sldMkLst>
-        <pc:spChg chg="mod">
-          <ac:chgData name="Clements, William" userId="cbdb0636-a496-422a-8d40-98c53d494d26" providerId="ADAL" clId="{FBD9B809-8698-1B41-A7A9-DEC9F2C60212}" dt="2023-09-13T14:45:09.104" v="169" actId="20577"/>
-          <ac:spMkLst>
-            <pc:docMk/>
-            <pc:sldMk cId="4291617032" sldId="328"/>
-            <ac:spMk id="3" creationId="{0613BDA8-F5C9-5292-9524-EED7903C8E96}"/>
-          </ac:spMkLst>
-        </pc:spChg>
-      </pc:sldChg>
-      <pc:sldChg chg="modSp add mod">
-        <pc:chgData name="Clements, William" userId="cbdb0636-a496-422a-8d40-98c53d494d26" providerId="ADAL" clId="{FBD9B809-8698-1B41-A7A9-DEC9F2C60212}" dt="2023-09-12T20:59:13.111" v="29" actId="20577"/>
-        <pc:sldMkLst>
-          <pc:docMk/>
-          <pc:sldMk cId="3328925876" sldId="471"/>
-        </pc:sldMkLst>
-        <pc:spChg chg="mod">
-          <ac:chgData name="Clements, William" userId="cbdb0636-a496-422a-8d40-98c53d494d26" providerId="ADAL" clId="{FBD9B809-8698-1B41-A7A9-DEC9F2C60212}" dt="2023-09-12T20:59:13.111" v="29" actId="20577"/>
-          <ac:spMkLst>
-            <pc:docMk/>
-            <pc:sldMk cId="3328925876" sldId="471"/>
-            <ac:spMk id="3" creationId="{31820C2E-1B74-6859-A135-D031730CED82}"/>
-          </ac:spMkLst>
-        </pc:spChg>
-      </pc:sldChg>
-      <pc:sldChg chg="modSp add mod">
-        <pc:chgData name="Clements, William" userId="cbdb0636-a496-422a-8d40-98c53d494d26" providerId="ADAL" clId="{FBD9B809-8698-1B41-A7A9-DEC9F2C60212}" dt="2023-09-13T14:47:23.968" v="177" actId="20577"/>
-        <pc:sldMkLst>
-          <pc:docMk/>
-          <pc:sldMk cId="2484045548" sldId="472"/>
-        </pc:sldMkLst>
-        <pc:spChg chg="mod">
-          <ac:chgData name="Clements, William" userId="cbdb0636-a496-422a-8d40-98c53d494d26" providerId="ADAL" clId="{FBD9B809-8698-1B41-A7A9-DEC9F2C60212}" dt="2023-09-13T14:47:23.968" v="177" actId="20577"/>
-          <ac:spMkLst>
-            <pc:docMk/>
-            <pc:sldMk cId="2484045548" sldId="472"/>
-            <ac:spMk id="3" creationId="{349DEE73-56C7-311B-9266-28C935131096}"/>
-          </ac:spMkLst>
-        </pc:spChg>
-      </pc:sldChg>
-    </pc:docChg>
-  </pc:docChgLst>
-</pc:chgInfo>
-</file>
-
 <file path=ppt/slideLayouts/slideLayout1.xml><?xml version="1.0" encoding="utf-8"?>
 <p:sldLayout xmlns:a="http://schemas.openxmlformats.org/drawingml/2006/main" xmlns:r="http://schemas.openxmlformats.org/officeDocument/2006/relationships" xmlns:p="http://schemas.openxmlformats.org/presentationml/2006/main" type="title" preserve="1">
   <p:cSld name="Title Slide">
@@ -737,7 +272,7 @@
           <a:p>
             <a:fld id="{10D69D3F-6819-8240-8770-CEE6C24684E8}" type="datetimeFigureOut">
               <a:rPr lang="en-US" smtClean="0"/>
-              <a:t>9/13/23</a:t>
+              <a:t>1/19/2024</a:t>
             </a:fld>
             <a:endParaRPr lang="en-US"/>
           </a:p>
@@ -907,7 +442,7 @@
           <a:p>
             <a:fld id="{10D69D3F-6819-8240-8770-CEE6C24684E8}" type="datetimeFigureOut">
               <a:rPr lang="en-US" smtClean="0"/>
-              <a:t>9/13/23</a:t>
+              <a:t>1/19/2024</a:t>
             </a:fld>
             <a:endParaRPr lang="en-US"/>
           </a:p>
@@ -1087,7 +622,7 @@
           <a:p>
             <a:fld id="{10D69D3F-6819-8240-8770-CEE6C24684E8}" type="datetimeFigureOut">
               <a:rPr lang="en-US" smtClean="0"/>
-              <a:t>9/13/23</a:t>
+              <a:t>1/19/2024</a:t>
             </a:fld>
             <a:endParaRPr lang="en-US"/>
           </a:p>
@@ -1257,7 +792,7 @@
           <a:p>
             <a:fld id="{10D69D3F-6819-8240-8770-CEE6C24684E8}" type="datetimeFigureOut">
               <a:rPr lang="en-US" smtClean="0"/>
-              <a:t>9/13/23</a:t>
+              <a:t>1/19/2024</a:t>
             </a:fld>
             <a:endParaRPr lang="en-US"/>
           </a:p>
@@ -1503,7 +1038,7 @@
           <a:p>
             <a:fld id="{10D69D3F-6819-8240-8770-CEE6C24684E8}" type="datetimeFigureOut">
               <a:rPr lang="en-US" smtClean="0"/>
-              <a:t>9/13/23</a:t>
+              <a:t>1/19/2024</a:t>
             </a:fld>
             <a:endParaRPr lang="en-US"/>
           </a:p>
@@ -1735,7 +1270,7 @@
           <a:p>
             <a:fld id="{10D69D3F-6819-8240-8770-CEE6C24684E8}" type="datetimeFigureOut">
               <a:rPr lang="en-US" smtClean="0"/>
-              <a:t>9/13/23</a:t>
+              <a:t>1/19/2024</a:t>
             </a:fld>
             <a:endParaRPr lang="en-US"/>
           </a:p>
@@ -2102,7 +1637,7 @@
           <a:p>
             <a:fld id="{10D69D3F-6819-8240-8770-CEE6C24684E8}" type="datetimeFigureOut">
               <a:rPr lang="en-US" smtClean="0"/>
-              <a:t>9/13/23</a:t>
+              <a:t>1/19/2024</a:t>
             </a:fld>
             <a:endParaRPr lang="en-US"/>
           </a:p>
@@ -2220,7 +1755,7 @@
           <a:p>
             <a:fld id="{10D69D3F-6819-8240-8770-CEE6C24684E8}" type="datetimeFigureOut">
               <a:rPr lang="en-US" smtClean="0"/>
-              <a:t>9/13/23</a:t>
+              <a:t>1/19/2024</a:t>
             </a:fld>
             <a:endParaRPr lang="en-US"/>
           </a:p>
@@ -2315,7 +1850,7 @@
           <a:p>
             <a:fld id="{10D69D3F-6819-8240-8770-CEE6C24684E8}" type="datetimeFigureOut">
               <a:rPr lang="en-US" smtClean="0"/>
-              <a:t>9/13/23</a:t>
+              <a:t>1/19/2024</a:t>
             </a:fld>
             <a:endParaRPr lang="en-US"/>
           </a:p>
@@ -2592,7 +2127,7 @@
           <a:p>
             <a:fld id="{10D69D3F-6819-8240-8770-CEE6C24684E8}" type="datetimeFigureOut">
               <a:rPr lang="en-US" smtClean="0"/>
-              <a:t>9/13/23</a:t>
+              <a:t>1/19/2024</a:t>
             </a:fld>
             <a:endParaRPr lang="en-US"/>
           </a:p>
@@ -2849,7 +2384,7 @@
           <a:p>
             <a:fld id="{10D69D3F-6819-8240-8770-CEE6C24684E8}" type="datetimeFigureOut">
               <a:rPr lang="en-US" smtClean="0"/>
-              <a:t>9/13/23</a:t>
+              <a:t>1/19/2024</a:t>
             </a:fld>
             <a:endParaRPr lang="en-US"/>
           </a:p>
@@ -3062,7 +2597,7 @@
           <a:p>
             <a:fld id="{10D69D3F-6819-8240-8770-CEE6C24684E8}" type="datetimeFigureOut">
               <a:rPr lang="en-US" smtClean="0"/>
-              <a:t>9/13/23</a:t>
+              <a:t>1/19/2024</a:t>
             </a:fld>
             <a:endParaRPr lang="en-US"/>
           </a:p>
@@ -12347,7 +11882,25 @@
                           </a:solidFill>
                           <a:latin typeface="Cambria Math" panose="02040503050406030204" pitchFamily="18" charset="0"/>
                         </a:rPr>
-                        <m:t>=6}</m:t>
+                        <m:t>=</m:t>
+                      </m:r>
+                      <m:r>
+                        <a:rPr lang="en-US" sz="2400" b="0" i="1" smtClean="0">
+                          <a:solidFill>
+                            <a:srgbClr val="FF0000"/>
+                          </a:solidFill>
+                          <a:latin typeface="Cambria Math" panose="02040503050406030204" pitchFamily="18" charset="0"/>
+                        </a:rPr>
+                        <m:t>6</m:t>
+                      </m:r>
+                      <m:r>
+                        <a:rPr lang="en-US" sz="2400" b="0" i="1" smtClean="0">
+                          <a:solidFill>
+                            <a:srgbClr val="FF0000"/>
+                          </a:solidFill>
+                          <a:latin typeface="Cambria Math" panose="02040503050406030204" pitchFamily="18" charset="0"/>
+                        </a:rPr>
+                        <m:t>}</m:t>
                       </m:r>
                     </m:oMath>
                   </m:oMathPara>
@@ -12523,7 +12076,16 @@
                               </a:solidFill>
                               <a:latin typeface="Cambria Math" panose="02040503050406030204" pitchFamily="18" charset="0"/>
                             </a:rPr>
-                            <m:t>=1</m:t>
+                            <m:t>=</m:t>
+                          </m:r>
+                          <m:r>
+                            <a:rPr lang="ar-AE" sz="3094" i="1">
+                              <a:solidFill>
+                                <a:srgbClr val="0070C0"/>
+                              </a:solidFill>
+                              <a:latin typeface="Cambria Math" panose="02040503050406030204" pitchFamily="18" charset="0"/>
+                            </a:rPr>
+                            <m:t>1</m:t>
                           </m:r>
                         </m:sub>
                         <m:sup>
@@ -12556,7 +12118,88 @@
                           </a:solidFill>
                           <a:latin typeface="Cambria Math" panose="02040503050406030204" pitchFamily="18" charset="0"/>
                         </a:rPr>
-                        <m:t>=1+2+3+4=10</m:t>
+                        <m:t>=</m:t>
+                      </m:r>
+                      <m:r>
+                        <a:rPr lang="ar-AE" sz="3094" b="0" i="1" smtClean="0">
+                          <a:solidFill>
+                            <a:srgbClr val="0070C0"/>
+                          </a:solidFill>
+                          <a:latin typeface="Cambria Math" panose="02040503050406030204" pitchFamily="18" charset="0"/>
+                        </a:rPr>
+                        <m:t>1</m:t>
+                      </m:r>
+                      <m:r>
+                        <a:rPr lang="ar-AE" sz="3094" b="0" i="1" smtClean="0">
+                          <a:solidFill>
+                            <a:srgbClr val="0070C0"/>
+                          </a:solidFill>
+                          <a:latin typeface="Cambria Math" panose="02040503050406030204" pitchFamily="18" charset="0"/>
+                        </a:rPr>
+                        <m:t>+</m:t>
+                      </m:r>
+                      <m:r>
+                        <a:rPr lang="ar-AE" sz="3094" b="0" i="1" smtClean="0">
+                          <a:solidFill>
+                            <a:srgbClr val="0070C0"/>
+                          </a:solidFill>
+                          <a:latin typeface="Cambria Math" panose="02040503050406030204" pitchFamily="18" charset="0"/>
+                        </a:rPr>
+                        <m:t>2</m:t>
+                      </m:r>
+                      <m:r>
+                        <a:rPr lang="ar-AE" sz="3094" b="0" i="1" smtClean="0">
+                          <a:solidFill>
+                            <a:srgbClr val="0070C0"/>
+                          </a:solidFill>
+                          <a:latin typeface="Cambria Math" panose="02040503050406030204" pitchFamily="18" charset="0"/>
+                        </a:rPr>
+                        <m:t>+</m:t>
+                      </m:r>
+                      <m:r>
+                        <a:rPr lang="ar-AE" sz="3094" b="0" i="1" smtClean="0">
+                          <a:solidFill>
+                            <a:srgbClr val="0070C0"/>
+                          </a:solidFill>
+                          <a:latin typeface="Cambria Math" panose="02040503050406030204" pitchFamily="18" charset="0"/>
+                        </a:rPr>
+                        <m:t>3</m:t>
+                      </m:r>
+                      <m:r>
+                        <a:rPr lang="ar-AE" sz="3094" b="0" i="1" smtClean="0">
+                          <a:solidFill>
+                            <a:srgbClr val="0070C0"/>
+                          </a:solidFill>
+                          <a:latin typeface="Cambria Math" panose="02040503050406030204" pitchFamily="18" charset="0"/>
+                        </a:rPr>
+                        <m:t>+</m:t>
+                      </m:r>
+                      <m:r>
+                        <a:rPr lang="ar-AE" sz="3094" b="0" i="1" smtClean="0">
+                          <a:solidFill>
+                            <a:srgbClr val="0070C0"/>
+                          </a:solidFill>
+                          <a:latin typeface="Cambria Math" panose="02040503050406030204" pitchFamily="18" charset="0"/>
+                        </a:rPr>
+                        <m:t>4</m:t>
+                      </m:r>
+                      <m:r>
+                        <a:rPr lang="ar-AE" sz="3094" b="0" i="1" smtClean="0">
+                          <a:solidFill>
+                            <a:srgbClr val="0070C0"/>
+                          </a:solidFill>
+                          <a:latin typeface="Cambria Math" panose="02040503050406030204" pitchFamily="18" charset="0"/>
+                        </a:rPr>
+                        <m:t>=</m:t>
+                      </m:r>
+                      <m:r>
+                        <a:rPr lang="ar-AE" sz="3094" b="0" i="1" smtClean="0">
+                          <a:solidFill>
+                            <a:srgbClr val="0070C0"/>
+                          </a:solidFill>
+                          <a:latin typeface="Cambria Math" panose="02040503050406030204" pitchFamily="18" charset="0"/>
+                        </a:rPr>
+                        <m:t>10</m:t>
                       </m:r>
                     </m:oMath>
                   </m:oMathPara>

</xml_diff>